<commit_message>
edits made after first printed read-through
</commit_message>
<xml_diff>
--- a/fig/uav_supervisor.pptx
+++ b/fig/uav_supervisor.pptx
@@ -104,6 +104,11 @@
       </a:defRPr>
     </a:lvl9pPr>
   </p:defaultTextStyle>
+  <p:extLst>
+    <p:ext uri="{EFAFB233-063F-42B5-8137-9DF3F51BA10A}">
+      <p15:sldGuideLst xmlns:p15="http://schemas.microsoft.com/office/powerpoint/2012/main"/>
+    </p:ext>
+  </p:extLst>
 </p:presentation>
 </file>
 
@@ -238,7 +243,7 @@
           <a:p>
             <a:fld id="{9046ABA8-9BF2-1C46-BAA8-DBDE76C8B00D}" type="datetimeFigureOut">
               <a:rPr lang="en-US" smtClean="0"/>
-              <a:t>2/26/18</a:t>
+              <a:t>3/27/18</a:t>
             </a:fld>
             <a:endParaRPr lang="en-US"/>
           </a:p>
@@ -408,7 +413,7 @@
           <a:p>
             <a:fld id="{9046ABA8-9BF2-1C46-BAA8-DBDE76C8B00D}" type="datetimeFigureOut">
               <a:rPr lang="en-US" smtClean="0"/>
-              <a:t>2/26/18</a:t>
+              <a:t>3/27/18</a:t>
             </a:fld>
             <a:endParaRPr lang="en-US"/>
           </a:p>
@@ -588,7 +593,7 @@
           <a:p>
             <a:fld id="{9046ABA8-9BF2-1C46-BAA8-DBDE76C8B00D}" type="datetimeFigureOut">
               <a:rPr lang="en-US" smtClean="0"/>
-              <a:t>2/26/18</a:t>
+              <a:t>3/27/18</a:t>
             </a:fld>
             <a:endParaRPr lang="en-US"/>
           </a:p>
@@ -758,7 +763,7 @@
           <a:p>
             <a:fld id="{9046ABA8-9BF2-1C46-BAA8-DBDE76C8B00D}" type="datetimeFigureOut">
               <a:rPr lang="en-US" smtClean="0"/>
-              <a:t>2/26/18</a:t>
+              <a:t>3/27/18</a:t>
             </a:fld>
             <a:endParaRPr lang="en-US"/>
           </a:p>
@@ -1002,7 +1007,7 @@
           <a:p>
             <a:fld id="{9046ABA8-9BF2-1C46-BAA8-DBDE76C8B00D}" type="datetimeFigureOut">
               <a:rPr lang="en-US" smtClean="0"/>
-              <a:t>2/26/18</a:t>
+              <a:t>3/27/18</a:t>
             </a:fld>
             <a:endParaRPr lang="en-US"/>
           </a:p>
@@ -1234,7 +1239,7 @@
           <a:p>
             <a:fld id="{9046ABA8-9BF2-1C46-BAA8-DBDE76C8B00D}" type="datetimeFigureOut">
               <a:rPr lang="en-US" smtClean="0"/>
-              <a:t>2/26/18</a:t>
+              <a:t>3/27/18</a:t>
             </a:fld>
             <a:endParaRPr lang="en-US"/>
           </a:p>
@@ -1601,7 +1606,7 @@
           <a:p>
             <a:fld id="{9046ABA8-9BF2-1C46-BAA8-DBDE76C8B00D}" type="datetimeFigureOut">
               <a:rPr lang="en-US" smtClean="0"/>
-              <a:t>2/26/18</a:t>
+              <a:t>3/27/18</a:t>
             </a:fld>
             <a:endParaRPr lang="en-US"/>
           </a:p>
@@ -1719,7 +1724,7 @@
           <a:p>
             <a:fld id="{9046ABA8-9BF2-1C46-BAA8-DBDE76C8B00D}" type="datetimeFigureOut">
               <a:rPr lang="en-US" smtClean="0"/>
-              <a:t>2/26/18</a:t>
+              <a:t>3/27/18</a:t>
             </a:fld>
             <a:endParaRPr lang="en-US"/>
           </a:p>
@@ -1814,7 +1819,7 @@
           <a:p>
             <a:fld id="{9046ABA8-9BF2-1C46-BAA8-DBDE76C8B00D}" type="datetimeFigureOut">
               <a:rPr lang="en-US" smtClean="0"/>
-              <a:t>2/26/18</a:t>
+              <a:t>3/27/18</a:t>
             </a:fld>
             <a:endParaRPr lang="en-US"/>
           </a:p>
@@ -2091,7 +2096,7 @@
           <a:p>
             <a:fld id="{9046ABA8-9BF2-1C46-BAA8-DBDE76C8B00D}" type="datetimeFigureOut">
               <a:rPr lang="en-US" smtClean="0"/>
-              <a:t>2/26/18</a:t>
+              <a:t>3/27/18</a:t>
             </a:fld>
             <a:endParaRPr lang="en-US"/>
           </a:p>
@@ -2348,7 +2353,7 @@
           <a:p>
             <a:fld id="{9046ABA8-9BF2-1C46-BAA8-DBDE76C8B00D}" type="datetimeFigureOut">
               <a:rPr lang="en-US" smtClean="0"/>
-              <a:t>2/26/18</a:t>
+              <a:t>3/27/18</a:t>
             </a:fld>
             <a:endParaRPr lang="en-US"/>
           </a:p>
@@ -2561,7 +2566,7 @@
           <a:p>
             <a:fld id="{9046ABA8-9BF2-1C46-BAA8-DBDE76C8B00D}" type="datetimeFigureOut">
               <a:rPr lang="en-US" smtClean="0"/>
-              <a:t>2/26/18</a:t>
+              <a:t>3/27/18</a:t>
             </a:fld>
             <a:endParaRPr lang="en-US"/>
           </a:p>
@@ -3040,7 +3045,7 @@
                 <a:ea typeface="Lato" pitchFamily="2" charset="-128"/>
                 <a:cs typeface="Lato" pitchFamily="2" charset="-128"/>
               </a:rPr>
-              <a:t>Remote Human Supervisor</a:t>
+              <a:t>     Remote Human Supervisor</a:t>
             </a:r>
           </a:p>
         </p:txBody>
@@ -3837,7 +3842,7 @@
                   <a:schemeClr val="tx1"/>
                 </a:solidFill>
               </a:rPr>
-              <a:t>Supervisor to UAV autopilots: control mode switching, mission changes, debugging</a:t>
+              <a:t>Supervisor to UAV autopilots: operating mode, control mode, mission</a:t>
             </a:r>
           </a:p>
         </p:txBody>
@@ -3955,11 +3960,49 @@
                   <a:schemeClr val="tx1"/>
                 </a:solidFill>
               </a:rPr>
-              <a:t>UAVs to supervisor: measurements, health monitoring, mission status</a:t>
-            </a:r>
-          </a:p>
-        </p:txBody>
-      </p:sp>
+              <a:t>UAVs to supervisor: measurements, state estimate, UAV health</a:t>
+            </a:r>
+          </a:p>
+        </p:txBody>
+      </p:sp>
+      <p:pic>
+        <p:nvPicPr>
+          <p:cNvPr id="3" name="Picture 2">
+            <a:extLst>
+              <a:ext uri="{FF2B5EF4-FFF2-40B4-BE49-F238E27FC236}">
+                <a16:creationId xmlns:a16="http://schemas.microsoft.com/office/drawing/2014/main" id="{960D23B3-01C2-3C49-B6DD-03AB0F2999D7}"/>
+              </a:ext>
+            </a:extLst>
+          </p:cNvPr>
+          <p:cNvPicPr>
+            <a:picLocks noChangeAspect="1"/>
+          </p:cNvPicPr>
+          <p:nvPr/>
+        </p:nvPicPr>
+        <p:blipFill>
+          <a:blip r:embed="rId3">
+            <a:duotone>
+              <a:schemeClr val="accent3">
+                <a:shade val="45000"/>
+                <a:satMod val="135000"/>
+              </a:schemeClr>
+              <a:prstClr val="white"/>
+            </a:duotone>
+          </a:blip>
+          <a:stretch>
+            <a:fillRect/>
+          </a:stretch>
+        </p:blipFill>
+        <p:spPr>
+          <a:xfrm>
+            <a:off x="428068" y="371459"/>
+            <a:ext cx="612940" cy="612940"/>
+          </a:xfrm>
+          <a:prstGeom prst="rect">
+            <a:avLst/>
+          </a:prstGeom>
+        </p:spPr>
+      </p:pic>
     </p:spTree>
     <p:extLst>
       <p:ext uri="{BB962C8B-B14F-4D97-AF65-F5344CB8AC3E}">

</xml_diff>